<commit_message>
First iteration of Demo
</commit_message>
<xml_diff>
--- a/Debugging.pptx
+++ b/Debugging.pptx
@@ -5,7 +5,7 @@
     <p:sldMasterId id="2147483648" r:id="rId1"/>
   </p:sldMasterIdLst>
   <p:notesMasterIdLst>
-    <p:notesMasterId r:id="rId29"/>
+    <p:notesMasterId r:id="rId32"/>
   </p:notesMasterIdLst>
   <p:sldIdLst>
     <p:sldId id="256" r:id="rId2"/>
@@ -35,6 +35,9 @@
     <p:sldId id="284" r:id="rId26"/>
     <p:sldId id="302" r:id="rId27"/>
     <p:sldId id="303" r:id="rId28"/>
+    <p:sldId id="304" r:id="rId29"/>
+    <p:sldId id="305" r:id="rId30"/>
+    <p:sldId id="306" r:id="rId31"/>
   </p:sldIdLst>
   <p:sldSz cx="12192000" cy="6858000"/>
   <p:notesSz cx="6858000" cy="9144000"/>
@@ -11731,13 +11734,8 @@
           <a:p>
             <a:r>
               <a:rPr lang="en-US" dirty="0"/>
-              <a:t>Concentrate on hypotheses and work in </a:t>
-            </a:r>
-            <a:r>
-              <a:rPr lang="en-US"/>
-              <a:t>parallel groups</a:t>
-            </a:r>
-            <a:endParaRPr lang="en-US" dirty="0"/>
+              <a:t>Concentrate on hypotheses and work in parallel groups</a:t>
+            </a:r>
           </a:p>
           <a:p>
             <a:r>
@@ -11757,6 +11755,185 @@
     <p:extLst>
       <p:ext uri="{BB962C8B-B14F-4D97-AF65-F5344CB8AC3E}">
         <p14:creationId xmlns:p14="http://schemas.microsoft.com/office/powerpoint/2010/main" val="2035309940"/>
+      </p:ext>
+    </p:extLst>
+  </p:cSld>
+  <p:clrMapOvr>
+    <a:masterClrMapping/>
+  </p:clrMapOvr>
+</p:sld>
+</file>
+
+<file path=ppt/slides/slide28.xml><?xml version="1.0" encoding="utf-8"?>
+<p:sld xmlns:a="http://schemas.openxmlformats.org/drawingml/2006/main" xmlns:r="http://schemas.openxmlformats.org/officeDocument/2006/relationships" xmlns:p="http://schemas.openxmlformats.org/presentationml/2006/main">
+  <p:cSld>
+    <p:spTree>
+      <p:nvGrpSpPr>
+        <p:cNvPr id="1" name=""/>
+        <p:cNvGrpSpPr/>
+        <p:nvPr/>
+      </p:nvGrpSpPr>
+      <p:grpSpPr>
+        <a:xfrm>
+          <a:off x="0" y="0"/>
+          <a:ext cx="0" cy="0"/>
+          <a:chOff x="0" y="0"/>
+          <a:chExt cx="0" cy="0"/>
+        </a:xfrm>
+      </p:grpSpPr>
+      <p:sp>
+        <p:nvSpPr>
+          <p:cNvPr id="4" name="Title 3">
+            <a:extLst>
+              <a:ext uri="{FF2B5EF4-FFF2-40B4-BE49-F238E27FC236}">
+                <a16:creationId xmlns:a16="http://schemas.microsoft.com/office/drawing/2014/main" id="{5D559ADB-31C0-4B79-8B41-83D9F5D007E2}"/>
+              </a:ext>
+            </a:extLst>
+          </p:cNvPr>
+          <p:cNvSpPr>
+            <a:spLocks noGrp="1"/>
+          </p:cNvSpPr>
+          <p:nvPr>
+            <p:ph type="title"/>
+          </p:nvPr>
+        </p:nvSpPr>
+        <p:spPr/>
+        <p:txBody>
+          <a:bodyPr/>
+          <a:lstStyle/>
+          <a:p>
+            <a:r>
+              <a:rPr lang="en-US" dirty="0"/>
+              <a:t>Profiling</a:t>
+            </a:r>
+          </a:p>
+        </p:txBody>
+      </p:sp>
+      <p:sp>
+        <p:nvSpPr>
+          <p:cNvPr id="5" name="Text Placeholder 4">
+            <a:extLst>
+              <a:ext uri="{FF2B5EF4-FFF2-40B4-BE49-F238E27FC236}">
+                <a16:creationId xmlns:a16="http://schemas.microsoft.com/office/drawing/2014/main" id="{CC15F277-CA4A-4EFF-8B22-80CA3695E4FB}"/>
+              </a:ext>
+            </a:extLst>
+          </p:cNvPr>
+          <p:cNvSpPr>
+            <a:spLocks noGrp="1"/>
+          </p:cNvSpPr>
+          <p:nvPr>
+            <p:ph type="body" idx="1"/>
+          </p:nvPr>
+        </p:nvSpPr>
+        <p:spPr/>
+        <p:txBody>
+          <a:bodyPr/>
+          <a:lstStyle/>
+          <a:p>
+            <a:endParaRPr lang="en-US"/>
+          </a:p>
+        </p:txBody>
+      </p:sp>
+    </p:spTree>
+    <p:extLst>
+      <p:ext uri="{BB962C8B-B14F-4D97-AF65-F5344CB8AC3E}">
+        <p14:creationId xmlns:p14="http://schemas.microsoft.com/office/powerpoint/2010/main" val="4213854344"/>
+      </p:ext>
+    </p:extLst>
+  </p:cSld>
+  <p:clrMapOvr>
+    <a:masterClrMapping/>
+  </p:clrMapOvr>
+</p:sld>
+</file>
+
+<file path=ppt/slides/slide29.xml><?xml version="1.0" encoding="utf-8"?>
+<p:sld xmlns:a="http://schemas.openxmlformats.org/drawingml/2006/main" xmlns:r="http://schemas.openxmlformats.org/officeDocument/2006/relationships" xmlns:p="http://schemas.openxmlformats.org/presentationml/2006/main">
+  <p:cSld>
+    <p:spTree>
+      <p:nvGrpSpPr>
+        <p:cNvPr id="1" name=""/>
+        <p:cNvGrpSpPr/>
+        <p:nvPr/>
+      </p:nvGrpSpPr>
+      <p:grpSpPr>
+        <a:xfrm>
+          <a:off x="0" y="0"/>
+          <a:ext cx="0" cy="0"/>
+          <a:chOff x="0" y="0"/>
+          <a:chExt cx="0" cy="0"/>
+        </a:xfrm>
+      </p:grpSpPr>
+      <p:sp>
+        <p:nvSpPr>
+          <p:cNvPr id="4" name="Title 3">
+            <a:extLst>
+              <a:ext uri="{FF2B5EF4-FFF2-40B4-BE49-F238E27FC236}">
+                <a16:creationId xmlns:a16="http://schemas.microsoft.com/office/drawing/2014/main" id="{C1967D69-690C-4681-929C-BC39FE826AED}"/>
+              </a:ext>
+            </a:extLst>
+          </p:cNvPr>
+          <p:cNvSpPr>
+            <a:spLocks noGrp="1"/>
+          </p:cNvSpPr>
+          <p:nvPr>
+            <p:ph type="title"/>
+          </p:nvPr>
+        </p:nvSpPr>
+        <p:spPr/>
+        <p:txBody>
+          <a:bodyPr/>
+          <a:lstStyle/>
+          <a:p>
+            <a:r>
+              <a:rPr lang="en-US" dirty="0"/>
+              <a:t>Before you use Visual Studio Debugging/Profiling, download symbols	</a:t>
+            </a:r>
+          </a:p>
+        </p:txBody>
+      </p:sp>
+      <p:sp>
+        <p:nvSpPr>
+          <p:cNvPr id="5" name="Content Placeholder 4">
+            <a:extLst>
+              <a:ext uri="{FF2B5EF4-FFF2-40B4-BE49-F238E27FC236}">
+                <a16:creationId xmlns:a16="http://schemas.microsoft.com/office/drawing/2014/main" id="{5AA22420-460B-4D0D-9716-A08FF598F620}"/>
+              </a:ext>
+            </a:extLst>
+          </p:cNvPr>
+          <p:cNvSpPr>
+            <a:spLocks noGrp="1"/>
+          </p:cNvSpPr>
+          <p:nvPr>
+            <p:ph idx="1"/>
+          </p:nvPr>
+        </p:nvSpPr>
+        <p:spPr/>
+        <p:txBody>
+          <a:bodyPr/>
+          <a:lstStyle/>
+          <a:p>
+            <a:r>
+              <a:rPr lang="en-US" dirty="0" err="1"/>
+              <a:t>Ctl</a:t>
+            </a:r>
+            <a:r>
+              <a:rPr lang="en-US" dirty="0"/>
+              <a:t> Q and type “Symbol”</a:t>
+            </a:r>
+          </a:p>
+          <a:p>
+            <a:r>
+              <a:rPr lang="en-US" dirty="0"/>
+              <a:t>Set cache, hit load, and get some tea</a:t>
+            </a:r>
+          </a:p>
+        </p:txBody>
+      </p:sp>
+    </p:spTree>
+    <p:extLst>
+      <p:ext uri="{BB962C8B-B14F-4D97-AF65-F5344CB8AC3E}">
+        <p14:creationId xmlns:p14="http://schemas.microsoft.com/office/powerpoint/2010/main" val="3187088046"/>
       </p:ext>
     </p:extLst>
   </p:cSld>
@@ -11997,6 +12174,89 @@
       </p:par>
     </p:tnLst>
   </p:timing>
+</p:sld>
+</file>
+
+<file path=ppt/slides/slide30.xml><?xml version="1.0" encoding="utf-8"?>
+<p:sld xmlns:a="http://schemas.openxmlformats.org/drawingml/2006/main" xmlns:r="http://schemas.openxmlformats.org/officeDocument/2006/relationships" xmlns:p="http://schemas.openxmlformats.org/presentationml/2006/main">
+  <p:cSld>
+    <p:spTree>
+      <p:nvGrpSpPr>
+        <p:cNvPr id="1" name=""/>
+        <p:cNvGrpSpPr/>
+        <p:nvPr/>
+      </p:nvGrpSpPr>
+      <p:grpSpPr>
+        <a:xfrm>
+          <a:off x="0" y="0"/>
+          <a:ext cx="0" cy="0"/>
+          <a:chOff x="0" y="0"/>
+          <a:chExt cx="0" cy="0"/>
+        </a:xfrm>
+      </p:grpSpPr>
+      <p:sp>
+        <p:nvSpPr>
+          <p:cNvPr id="2" name="Title 1">
+            <a:extLst>
+              <a:ext uri="{FF2B5EF4-FFF2-40B4-BE49-F238E27FC236}">
+                <a16:creationId xmlns:a16="http://schemas.microsoft.com/office/drawing/2014/main" id="{459D4BF3-E2D9-40C0-BF52-AEDBE881A97D}"/>
+              </a:ext>
+            </a:extLst>
+          </p:cNvPr>
+          <p:cNvSpPr>
+            <a:spLocks noGrp="1"/>
+          </p:cNvSpPr>
+          <p:nvPr>
+            <p:ph type="title"/>
+          </p:nvPr>
+        </p:nvSpPr>
+        <p:spPr/>
+        <p:txBody>
+          <a:bodyPr/>
+          <a:lstStyle/>
+          <a:p>
+            <a:r>
+              <a:rPr lang="en-US"/>
+              <a:t>That Window you just close…</a:t>
+            </a:r>
+          </a:p>
+        </p:txBody>
+      </p:sp>
+      <p:sp>
+        <p:nvSpPr>
+          <p:cNvPr id="3" name="Content Placeholder 2">
+            <a:extLst>
+              <a:ext uri="{FF2B5EF4-FFF2-40B4-BE49-F238E27FC236}">
+                <a16:creationId xmlns:a16="http://schemas.microsoft.com/office/drawing/2014/main" id="{960AB389-CF1F-4BD4-870D-200554241049}"/>
+              </a:ext>
+            </a:extLst>
+          </p:cNvPr>
+          <p:cNvSpPr>
+            <a:spLocks noGrp="1"/>
+          </p:cNvSpPr>
+          <p:nvPr>
+            <p:ph idx="1"/>
+          </p:nvPr>
+        </p:nvSpPr>
+        <p:spPr/>
+        <p:txBody>
+          <a:bodyPr/>
+          <a:lstStyle/>
+          <a:p>
+            <a:endParaRPr lang="en-US"/>
+          </a:p>
+        </p:txBody>
+      </p:sp>
+    </p:spTree>
+    <p:extLst>
+      <p:ext uri="{BB962C8B-B14F-4D97-AF65-F5344CB8AC3E}">
+        <p14:creationId xmlns:p14="http://schemas.microsoft.com/office/powerpoint/2010/main" val="3234486819"/>
+      </p:ext>
+    </p:extLst>
+  </p:cSld>
+  <p:clrMapOvr>
+    <a:masterClrMapping/>
+  </p:clrMapOvr>
 </p:sld>
 </file>
 

</xml_diff>

<commit_message>
Clean program.cs and adjusted values
</commit_message>
<xml_diff>
--- a/Debugging.pptx
+++ b/Debugging.pptx
@@ -24,20 +24,20 @@
     <p:sldId id="270" r:id="rId15"/>
     <p:sldId id="271" r:id="rId16"/>
     <p:sldId id="273" r:id="rId17"/>
-    <p:sldId id="272" r:id="rId18"/>
-    <p:sldId id="301" r:id="rId19"/>
-    <p:sldId id="279" r:id="rId20"/>
-    <p:sldId id="280" r:id="rId21"/>
-    <p:sldId id="281" r:id="rId22"/>
-    <p:sldId id="282" r:id="rId23"/>
-    <p:sldId id="300" r:id="rId24"/>
-    <p:sldId id="283" r:id="rId25"/>
-    <p:sldId id="284" r:id="rId26"/>
-    <p:sldId id="302" r:id="rId27"/>
-    <p:sldId id="303" r:id="rId28"/>
-    <p:sldId id="304" r:id="rId29"/>
-    <p:sldId id="305" r:id="rId30"/>
-    <p:sldId id="306" r:id="rId31"/>
+    <p:sldId id="279" r:id="rId18"/>
+    <p:sldId id="280" r:id="rId19"/>
+    <p:sldId id="281" r:id="rId20"/>
+    <p:sldId id="300" r:id="rId21"/>
+    <p:sldId id="282" r:id="rId22"/>
+    <p:sldId id="283" r:id="rId23"/>
+    <p:sldId id="284" r:id="rId24"/>
+    <p:sldId id="302" r:id="rId25"/>
+    <p:sldId id="303" r:id="rId26"/>
+    <p:sldId id="304" r:id="rId27"/>
+    <p:sldId id="305" r:id="rId28"/>
+    <p:sldId id="307" r:id="rId29"/>
+    <p:sldId id="308" r:id="rId30"/>
+    <p:sldId id="272" r:id="rId31"/>
   </p:sldIdLst>
   <p:sldSz cx="12192000" cy="6858000"/>
   <p:notesSz cx="6858000" cy="9144000"/>
@@ -237,7 +237,7 @@
           <a:p>
             <a:fld id="{E0A26A75-239A-4169-9919-5040B9FC065C}" type="datetimeFigureOut">
               <a:rPr lang="en-US" smtClean="0"/>
-              <a:t>4/21/2019</a:t>
+              <a:t>5/6/2019</a:t>
             </a:fld>
             <a:endParaRPr lang="en-US"/>
           </a:p>
@@ -1894,7 +1894,7 @@
           <a:p>
             <a:fld id="{C9EE14CF-DF4C-4D13-9A8D-6EF1DD532F6A}" type="datetimeFigureOut">
               <a:rPr lang="en-US" smtClean="0"/>
-              <a:t>4/21/2019</a:t>
+              <a:t>5/6/2019</a:t>
             </a:fld>
             <a:endParaRPr lang="en-US"/>
           </a:p>
@@ -2092,7 +2092,7 @@
           <a:p>
             <a:fld id="{C9EE14CF-DF4C-4D13-9A8D-6EF1DD532F6A}" type="datetimeFigureOut">
               <a:rPr lang="en-US" smtClean="0"/>
-              <a:t>4/21/2019</a:t>
+              <a:t>5/6/2019</a:t>
             </a:fld>
             <a:endParaRPr lang="en-US"/>
           </a:p>
@@ -2300,7 +2300,7 @@
           <a:p>
             <a:fld id="{C9EE14CF-DF4C-4D13-9A8D-6EF1DD532F6A}" type="datetimeFigureOut">
               <a:rPr lang="en-US" smtClean="0"/>
-              <a:t>4/21/2019</a:t>
+              <a:t>5/6/2019</a:t>
             </a:fld>
             <a:endParaRPr lang="en-US"/>
           </a:p>
@@ -2727,7 +2727,7 @@
           <a:p>
             <a:fld id="{C9EE14CF-DF4C-4D13-9A8D-6EF1DD532F6A}" type="datetimeFigureOut">
               <a:rPr lang="en-US" smtClean="0"/>
-              <a:t>4/21/2019</a:t>
+              <a:t>5/6/2019</a:t>
             </a:fld>
             <a:endParaRPr lang="en-US"/>
           </a:p>
@@ -3002,7 +3002,7 @@
           <a:p>
             <a:fld id="{C9EE14CF-DF4C-4D13-9A8D-6EF1DD532F6A}" type="datetimeFigureOut">
               <a:rPr lang="en-US" smtClean="0"/>
-              <a:t>4/21/2019</a:t>
+              <a:t>5/6/2019</a:t>
             </a:fld>
             <a:endParaRPr lang="en-US"/>
           </a:p>
@@ -3267,7 +3267,7 @@
           <a:p>
             <a:fld id="{C9EE14CF-DF4C-4D13-9A8D-6EF1DD532F6A}" type="datetimeFigureOut">
               <a:rPr lang="en-US" smtClean="0"/>
-              <a:t>4/21/2019</a:t>
+              <a:t>5/6/2019</a:t>
             </a:fld>
             <a:endParaRPr lang="en-US"/>
           </a:p>
@@ -3679,7 +3679,7 @@
           <a:p>
             <a:fld id="{C9EE14CF-DF4C-4D13-9A8D-6EF1DD532F6A}" type="datetimeFigureOut">
               <a:rPr lang="en-US" smtClean="0"/>
-              <a:t>4/21/2019</a:t>
+              <a:t>5/6/2019</a:t>
             </a:fld>
             <a:endParaRPr lang="en-US"/>
           </a:p>
@@ -3820,7 +3820,7 @@
           <a:p>
             <a:fld id="{C9EE14CF-DF4C-4D13-9A8D-6EF1DD532F6A}" type="datetimeFigureOut">
               <a:rPr lang="en-US" smtClean="0"/>
-              <a:t>4/21/2019</a:t>
+              <a:t>5/6/2019</a:t>
             </a:fld>
             <a:endParaRPr lang="en-US"/>
           </a:p>
@@ -3933,7 +3933,7 @@
           <a:p>
             <a:fld id="{C9EE14CF-DF4C-4D13-9A8D-6EF1DD532F6A}" type="datetimeFigureOut">
               <a:rPr lang="en-US" smtClean="0"/>
-              <a:t>4/21/2019</a:t>
+              <a:t>5/6/2019</a:t>
             </a:fld>
             <a:endParaRPr lang="en-US"/>
           </a:p>
@@ -4244,7 +4244,7 @@
           <a:p>
             <a:fld id="{C9EE14CF-DF4C-4D13-9A8D-6EF1DD532F6A}" type="datetimeFigureOut">
               <a:rPr lang="en-US" smtClean="0"/>
-              <a:t>4/21/2019</a:t>
+              <a:t>5/6/2019</a:t>
             </a:fld>
             <a:endParaRPr lang="en-US"/>
           </a:p>
@@ -4532,7 +4532,7 @@
           <a:p>
             <a:fld id="{C9EE14CF-DF4C-4D13-9A8D-6EF1DD532F6A}" type="datetimeFigureOut">
               <a:rPr lang="en-US" smtClean="0"/>
-              <a:t>4/21/2019</a:t>
+              <a:t>5/6/2019</a:t>
             </a:fld>
             <a:endParaRPr lang="en-US"/>
           </a:p>
@@ -4773,7 +4773,7 @@
           <a:p>
             <a:fld id="{C9EE14CF-DF4C-4D13-9A8D-6EF1DD532F6A}" type="datetimeFigureOut">
               <a:rPr lang="en-US" smtClean="0"/>
-              <a:t>4/21/2019</a:t>
+              <a:t>5/6/2019</a:t>
             </a:fld>
             <a:endParaRPr lang="en-US"/>
           </a:p>
@@ -6247,166 +6247,6 @@
       </p:grpSpPr>
       <p:sp>
         <p:nvSpPr>
-          <p:cNvPr id="4" name="Rectangle 3"/>
-          <p:cNvSpPr/>
-          <p:nvPr/>
-        </p:nvSpPr>
-        <p:spPr>
-          <a:xfrm>
-            <a:off x="792113" y="1266219"/>
-            <a:ext cx="10684991" cy="4524315"/>
-          </a:xfrm>
-          <a:prstGeom prst="rect">
-            <a:avLst/>
-          </a:prstGeom>
-        </p:spPr>
-        <p:txBody>
-          <a:bodyPr wrap="square">
-            <a:spAutoFit/>
-          </a:bodyPr>
-          <a:lstStyle/>
-          <a:p>
-            <a:r>
-              <a:rPr lang="en-US" sz="2400" dirty="0">
-                <a:solidFill>
-                  <a:srgbClr val="000000"/>
-                </a:solidFill>
-                <a:latin typeface="ff-dagny-web-pro"/>
-              </a:rPr>
-              <a:t>Debugging is a game of strategy.</a:t>
-            </a:r>
-          </a:p>
-          <a:p>
-            <a:r>
-              <a:rPr lang="en-US" sz="2400" dirty="0">
-                <a:solidFill>
-                  <a:srgbClr val="000000"/>
-                </a:solidFill>
-                <a:latin typeface="ff-dagny-web-pro"/>
-              </a:rPr>
-              <a:t> </a:t>
-            </a:r>
-          </a:p>
-          <a:p>
-            <a:r>
-              <a:rPr lang="en-US" sz="2400" dirty="0">
-                <a:solidFill>
-                  <a:srgbClr val="000000"/>
-                </a:solidFill>
-                <a:latin typeface="ff-dagny-web-pro"/>
-              </a:rPr>
-              <a:t>The rules are set by the computer, your debugger, and requirements or user expectations. </a:t>
-            </a:r>
-          </a:p>
-          <a:p>
-            <a:endParaRPr lang="en-US" sz="2400" dirty="0">
-              <a:solidFill>
-                <a:srgbClr val="000000"/>
-              </a:solidFill>
-              <a:latin typeface="ff-dagny-web-pro"/>
-            </a:endParaRPr>
-          </a:p>
-          <a:p>
-            <a:r>
-              <a:rPr lang="en-US" sz="2400" dirty="0">
-                <a:solidFill>
-                  <a:srgbClr val="000000"/>
-                </a:solidFill>
-                <a:latin typeface="ff-dagny-web-pro"/>
-              </a:rPr>
-              <a:t>You may enter the contest expecting a trivial opponent, only to find it like Hydra with two new problems sprouting for each one that you solve. </a:t>
-            </a:r>
-          </a:p>
-          <a:p>
-            <a:endParaRPr lang="en-US" sz="2400" dirty="0">
-              <a:solidFill>
-                <a:srgbClr val="000000"/>
-              </a:solidFill>
-              <a:latin typeface="ff-dagny-web-pro"/>
-            </a:endParaRPr>
-          </a:p>
-          <a:p>
-            <a:r>
-              <a:rPr lang="en-US" sz="2400" dirty="0">
-                <a:solidFill>
-                  <a:srgbClr val="000000"/>
-                </a:solidFill>
-                <a:latin typeface="ff-dagny-web-pro"/>
-              </a:rPr>
-              <a:t>It’s a critical game because we fix bugs from the time we first check in code, and the cost of each bug tends to increase across the project lifecycle.</a:t>
-            </a:r>
-            <a:br>
-              <a:rPr lang="en-US" sz="2400" dirty="0"/>
-            </a:br>
-            <a:br>
-              <a:rPr lang="en-US" sz="2400" dirty="0"/>
-            </a:br>
-            <a:endParaRPr lang="en-US" sz="2400" dirty="0"/>
-          </a:p>
-        </p:txBody>
-      </p:sp>
-    </p:spTree>
-    <p:extLst>
-      <p:ext uri="{BB962C8B-B14F-4D97-AF65-F5344CB8AC3E}">
-        <p14:creationId xmlns:p14="http://schemas.microsoft.com/office/powerpoint/2010/main" val="3066053709"/>
-      </p:ext>
-    </p:extLst>
-  </p:cSld>
-  <p:clrMapOvr>
-    <a:masterClrMapping/>
-  </p:clrMapOvr>
-</p:sld>
-</file>
-
-<file path=ppt/slides/slide18.xml><?xml version="1.0" encoding="utf-8"?>
-<p:sld xmlns:a="http://schemas.openxmlformats.org/drawingml/2006/main" xmlns:r="http://schemas.openxmlformats.org/officeDocument/2006/relationships" xmlns:p="http://schemas.openxmlformats.org/presentationml/2006/main">
-  <p:cSld>
-    <p:spTree>
-      <p:nvGrpSpPr>
-        <p:cNvPr id="1" name=""/>
-        <p:cNvGrpSpPr/>
-        <p:nvPr/>
-      </p:nvGrpSpPr>
-      <p:grpSpPr>
-        <a:xfrm>
-          <a:off x="0" y="0"/>
-          <a:ext cx="0" cy="0"/>
-          <a:chOff x="0" y="0"/>
-          <a:chExt cx="0" cy="0"/>
-        </a:xfrm>
-      </p:grpSpPr>
-    </p:spTree>
-    <p:extLst>
-      <p:ext uri="{BB962C8B-B14F-4D97-AF65-F5344CB8AC3E}">
-        <p14:creationId xmlns:p14="http://schemas.microsoft.com/office/powerpoint/2010/main" val="273324670"/>
-      </p:ext>
-    </p:extLst>
-  </p:cSld>
-  <p:clrMapOvr>
-    <a:masterClrMapping/>
-  </p:clrMapOvr>
-</p:sld>
-</file>
-
-<file path=ppt/slides/slide19.xml><?xml version="1.0" encoding="utf-8"?>
-<p:sld xmlns:a="http://schemas.openxmlformats.org/drawingml/2006/main" xmlns:r="http://schemas.openxmlformats.org/officeDocument/2006/relationships" xmlns:p="http://schemas.openxmlformats.org/presentationml/2006/main">
-  <p:cSld>
-    <p:spTree>
-      <p:nvGrpSpPr>
-        <p:cNvPr id="1" name=""/>
-        <p:cNvGrpSpPr/>
-        <p:nvPr/>
-      </p:nvGrpSpPr>
-      <p:grpSpPr>
-        <a:xfrm>
-          <a:off x="0" y="0"/>
-          <a:ext cx="0" cy="0"/>
-          <a:chOff x="0" y="0"/>
-          <a:chExt cx="0" cy="0"/>
-        </a:xfrm>
-      </p:grpSpPr>
-      <p:sp>
-        <p:nvSpPr>
           <p:cNvPr id="3" name="TextBox 2"/>
           <p:cNvSpPr txBox="1"/>
           <p:nvPr/>
@@ -6876,7 +6716,7 @@
 </p:sld>
 </file>
 
-<file path=ppt/slides/slide2.xml><?xml version="1.0" encoding="utf-8"?>
+<file path=ppt/slides/slide18.xml><?xml version="1.0" encoding="utf-8"?>
 <p:sld xmlns:a="http://schemas.openxmlformats.org/drawingml/2006/main" xmlns:r="http://schemas.openxmlformats.org/officeDocument/2006/relationships" xmlns:p="http://schemas.openxmlformats.org/presentationml/2006/main">
   <p:cSld>
     <p:spTree>
@@ -6895,89 +6735,6 @@
       </p:grpSpPr>
       <p:sp>
         <p:nvSpPr>
-          <p:cNvPr id="3" name="Title 2">
-            <a:extLst>
-              <a:ext uri="{FF2B5EF4-FFF2-40B4-BE49-F238E27FC236}">
-                <a16:creationId xmlns:a16="http://schemas.microsoft.com/office/drawing/2014/main" id="{547F85C0-C97B-48AE-BE66-1B2CF85B57C2}"/>
-              </a:ext>
-            </a:extLst>
-          </p:cNvPr>
-          <p:cNvSpPr>
-            <a:spLocks noGrp="1"/>
-          </p:cNvSpPr>
-          <p:nvPr>
-            <p:ph type="title"/>
-          </p:nvPr>
-        </p:nvSpPr>
-        <p:spPr/>
-        <p:txBody>
-          <a:bodyPr/>
-          <a:lstStyle/>
-          <a:p>
-            <a:r>
-              <a:rPr lang="en-US" dirty="0"/>
-              <a:t>Debugging</a:t>
-            </a:r>
-          </a:p>
-        </p:txBody>
-      </p:sp>
-      <p:sp>
-        <p:nvSpPr>
-          <p:cNvPr id="4" name="Text Placeholder 3">
-            <a:extLst>
-              <a:ext uri="{FF2B5EF4-FFF2-40B4-BE49-F238E27FC236}">
-                <a16:creationId xmlns:a16="http://schemas.microsoft.com/office/drawing/2014/main" id="{9DADB611-9896-484C-AD8B-DD362B09DE05}"/>
-              </a:ext>
-            </a:extLst>
-          </p:cNvPr>
-          <p:cNvSpPr>
-            <a:spLocks noGrp="1"/>
-          </p:cNvSpPr>
-          <p:nvPr>
-            <p:ph type="body" idx="1"/>
-          </p:nvPr>
-        </p:nvSpPr>
-        <p:spPr/>
-        <p:txBody>
-          <a:bodyPr/>
-          <a:lstStyle/>
-          <a:p>
-            <a:endParaRPr lang="en-US"/>
-          </a:p>
-        </p:txBody>
-      </p:sp>
-    </p:spTree>
-    <p:extLst>
-      <p:ext uri="{BB962C8B-B14F-4D97-AF65-F5344CB8AC3E}">
-        <p14:creationId xmlns:p14="http://schemas.microsoft.com/office/powerpoint/2010/main" val="1118239756"/>
-      </p:ext>
-    </p:extLst>
-  </p:cSld>
-  <p:clrMapOvr>
-    <a:masterClrMapping/>
-  </p:clrMapOvr>
-</p:sld>
-</file>
-
-<file path=ppt/slides/slide20.xml><?xml version="1.0" encoding="utf-8"?>
-<p:sld xmlns:a="http://schemas.openxmlformats.org/drawingml/2006/main" xmlns:r="http://schemas.openxmlformats.org/officeDocument/2006/relationships" xmlns:p="http://schemas.openxmlformats.org/presentationml/2006/main">
-  <p:cSld>
-    <p:spTree>
-      <p:nvGrpSpPr>
-        <p:cNvPr id="1" name=""/>
-        <p:cNvGrpSpPr/>
-        <p:nvPr/>
-      </p:nvGrpSpPr>
-      <p:grpSpPr>
-        <a:xfrm>
-          <a:off x="0" y="0"/>
-          <a:ext cx="0" cy="0"/>
-          <a:chOff x="0" y="0"/>
-          <a:chExt cx="0" cy="0"/>
-        </a:xfrm>
-      </p:grpSpPr>
-      <p:sp>
-        <p:nvSpPr>
           <p:cNvPr id="3" name="Title 2"/>
           <p:cNvSpPr>
             <a:spLocks noGrp="1"/>
@@ -7010,8 +6767,8 @@
         </p:nvSpPr>
         <p:spPr>
           <a:xfrm>
-            <a:off x="2309768" y="1862592"/>
-            <a:ext cx="7572462" cy="4267200"/>
+            <a:off x="2309768" y="2310938"/>
+            <a:ext cx="7572462" cy="3818854"/>
           </a:xfrm>
         </p:spPr>
         <p:txBody>
@@ -7120,11 +6877,7 @@
                                           </p:stCondLst>
                                         </p:cTn>
                                         <p:tgtEl>
-                                          <p:spTgt spid="4">
-                                            <p:txEl>
-                                              <p:pRg st="0" end="0"/>
-                                            </p:txEl>
-                                          </p:spTgt>
+                                          <p:spTgt spid="5"/>
                                         </p:tgtEl>
                                         <p:attrNameLst>
                                           <p:attrName>style.visibility</p:attrName>
@@ -7138,11 +6891,7 @@
                                       <p:cBhvr>
                                         <p:cTn id="7" dur="500"/>
                                         <p:tgtEl>
-                                          <p:spTgt spid="4">
-                                            <p:txEl>
-                                              <p:pRg st="0" end="0"/>
-                                            </p:txEl>
-                                          </p:spTgt>
+                                          <p:spTgt spid="5"/>
                                         </p:tgtEl>
                                       </p:cBhvr>
                                     </p:animEffect>
@@ -7183,7 +6932,7 @@
                                         <p:tgtEl>
                                           <p:spTgt spid="4">
                                             <p:txEl>
-                                              <p:pRg st="1" end="1"/>
+                                              <p:pRg st="0" end="0"/>
                                             </p:txEl>
                                           </p:spTgt>
                                         </p:tgtEl>
@@ -7201,7 +6950,7 @@
                                         <p:tgtEl>
                                           <p:spTgt spid="4">
                                             <p:txEl>
-                                              <p:pRg st="1" end="1"/>
+                                              <p:pRg st="0" end="0"/>
                                             </p:txEl>
                                           </p:spTgt>
                                         </p:tgtEl>
@@ -7242,7 +6991,11 @@
                                           </p:stCondLst>
                                         </p:cTn>
                                         <p:tgtEl>
-                                          <p:spTgt spid="5"/>
+                                          <p:spTgt spid="4">
+                                            <p:txEl>
+                                              <p:pRg st="1" end="1"/>
+                                            </p:txEl>
+                                          </p:spTgt>
                                         </p:tgtEl>
                                         <p:attrNameLst>
                                           <p:attrName>style.visibility</p:attrName>
@@ -7256,7 +7009,11 @@
                                       <p:cBhvr>
                                         <p:cTn id="17" dur="500"/>
                                         <p:tgtEl>
-                                          <p:spTgt spid="5"/>
+                                          <p:spTgt spid="4">
+                                            <p:txEl>
+                                              <p:pRg st="1" end="1"/>
+                                            </p:txEl>
+                                          </p:spTgt>
                                         </p:tgtEl>
                                       </p:cBhvr>
                                     </p:animEffect>
@@ -7298,7 +7055,7 @@
 </p:sld>
 </file>
 
-<file path=ppt/slides/slide21.xml><?xml version="1.0" encoding="utf-8"?>
+<file path=ppt/slides/slide19.xml><?xml version="1.0" encoding="utf-8"?>
 <p:sld xmlns:a="http://schemas.openxmlformats.org/drawingml/2006/main" xmlns:r="http://schemas.openxmlformats.org/officeDocument/2006/relationships" xmlns:p="http://schemas.openxmlformats.org/presentationml/2006/main">
   <p:cSld>
     <p:spTree>
@@ -9025,7 +8782,7 @@
 </p:sld>
 </file>
 
-<file path=ppt/slides/slide22.xml><?xml version="1.0" encoding="utf-8"?>
+<file path=ppt/slides/slide2.xml><?xml version="1.0" encoding="utf-8"?>
 <p:sld xmlns:a="http://schemas.openxmlformats.org/drawingml/2006/main" xmlns:r="http://schemas.openxmlformats.org/officeDocument/2006/relationships" xmlns:p="http://schemas.openxmlformats.org/presentationml/2006/main">
   <p:cSld>
     <p:spTree>
@@ -9044,80 +8801,71 @@
       </p:grpSpPr>
       <p:sp>
         <p:nvSpPr>
-          <p:cNvPr id="5" name="Rectangle 4"/>
-          <p:cNvSpPr/>
-          <p:nvPr/>
-        </p:nvSpPr>
-        <p:spPr>
-          <a:xfrm>
-            <a:off x="716665" y="2059287"/>
-            <a:ext cx="10758669" cy="1508105"/>
-          </a:xfrm>
-          <a:prstGeom prst="rect">
-            <a:avLst/>
-          </a:prstGeom>
-          <a:noFill/>
-          <a:ln w="9525">
-            <a:noFill/>
-            <a:miter lim="800000"/>
-            <a:headEnd/>
-            <a:tailEnd/>
-          </a:ln>
-        </p:spPr>
-        <p:txBody>
-          <a:bodyPr wrap="square" rtlCol="0">
-            <a:spAutoFit/>
-          </a:bodyPr>
-          <a:lstStyle/>
-          <a:p>
-            <a:pPr algn="ctr"/>
-            <a:endParaRPr lang="en-US" sz="4000" b="1" dirty="0">
-              <a:solidFill>
-                <a:srgbClr val="002060"/>
-              </a:solidFill>
-              <a:latin typeface="+mj-lt"/>
-            </a:endParaRPr>
-          </a:p>
-          <a:p>
-            <a:pPr algn="ctr"/>
-            <a:endParaRPr lang="en-US" sz="2000" b="1" dirty="0">
-              <a:solidFill>
-                <a:srgbClr val="002060"/>
-              </a:solidFill>
-              <a:latin typeface="+mj-lt"/>
-            </a:endParaRPr>
-          </a:p>
-          <a:p>
-            <a:pPr algn="ctr"/>
-            <a:r>
-              <a:rPr lang="en-US" sz="3200" dirty="0">
-                <a:solidFill>
-                  <a:srgbClr val="002060"/>
-                </a:solidFill>
-                <a:latin typeface="+mj-lt"/>
-              </a:rPr>
-              <a:t>Scientific Method Walkthrough</a:t>
-            </a:r>
+          <p:cNvPr id="3" name="Title 2">
+            <a:extLst>
+              <a:ext uri="{FF2B5EF4-FFF2-40B4-BE49-F238E27FC236}">
+                <a16:creationId xmlns:a16="http://schemas.microsoft.com/office/drawing/2014/main" id="{547F85C0-C97B-48AE-BE66-1B2CF85B57C2}"/>
+              </a:ext>
+            </a:extLst>
+          </p:cNvPr>
+          <p:cNvSpPr>
+            <a:spLocks noGrp="1"/>
+          </p:cNvSpPr>
+          <p:nvPr>
+            <p:ph type="title"/>
+          </p:nvPr>
+        </p:nvSpPr>
+        <p:spPr/>
+        <p:txBody>
+          <a:bodyPr/>
+          <a:lstStyle/>
+          <a:p>
+            <a:r>
+              <a:rPr lang="en-US" dirty="0"/>
+              <a:t>Debugging</a:t>
+            </a:r>
+          </a:p>
+        </p:txBody>
+      </p:sp>
+      <p:sp>
+        <p:nvSpPr>
+          <p:cNvPr id="4" name="Text Placeholder 3">
+            <a:extLst>
+              <a:ext uri="{FF2B5EF4-FFF2-40B4-BE49-F238E27FC236}">
+                <a16:creationId xmlns:a16="http://schemas.microsoft.com/office/drawing/2014/main" id="{9DADB611-9896-484C-AD8B-DD362B09DE05}"/>
+              </a:ext>
+            </a:extLst>
+          </p:cNvPr>
+          <p:cNvSpPr>
+            <a:spLocks noGrp="1"/>
+          </p:cNvSpPr>
+          <p:nvPr>
+            <p:ph type="body" idx="1"/>
+          </p:nvPr>
+        </p:nvSpPr>
+        <p:spPr/>
+        <p:txBody>
+          <a:bodyPr/>
+          <a:lstStyle/>
+          <a:p>
+            <a:endParaRPr lang="en-US"/>
           </a:p>
         </p:txBody>
       </p:sp>
     </p:spTree>
     <p:extLst>
       <p:ext uri="{BB962C8B-B14F-4D97-AF65-F5344CB8AC3E}">
-        <p14:creationId xmlns:p14="http://schemas.microsoft.com/office/powerpoint/2010/main" val="3402780149"/>
+        <p14:creationId xmlns:p14="http://schemas.microsoft.com/office/powerpoint/2010/main" val="1118239756"/>
       </p:ext>
     </p:extLst>
   </p:cSld>
   <p:clrMapOvr>
     <a:masterClrMapping/>
   </p:clrMapOvr>
-  <p:transition>
-    <p:fade/>
-  </p:transition>
 </p:sld>
 </file>
 
-<file path=ppt/slides/slide23.xml><?xml version="1.0" encoding="utf-8"?>
+<file path=ppt/slides/slide20.xml><?xml version="1.0" encoding="utf-8"?>
 <p:sld xmlns:a="http://schemas.openxmlformats.org/drawingml/2006/main" xmlns:r="http://schemas.openxmlformats.org/officeDocument/2006/relationships" xmlns:p="http://schemas.openxmlformats.org/presentationml/2006/main">
   <p:cSld>
     <p:spTree>
@@ -9186,7 +8934,99 @@
 </p:sld>
 </file>
 
-<file path=ppt/slides/slide24.xml><?xml version="1.0" encoding="utf-8"?>
+<file path=ppt/slides/slide21.xml><?xml version="1.0" encoding="utf-8"?>
+<p:sld xmlns:a="http://schemas.openxmlformats.org/drawingml/2006/main" xmlns:r="http://schemas.openxmlformats.org/officeDocument/2006/relationships" xmlns:p="http://schemas.openxmlformats.org/presentationml/2006/main">
+  <p:cSld>
+    <p:spTree>
+      <p:nvGrpSpPr>
+        <p:cNvPr id="1" name=""/>
+        <p:cNvGrpSpPr/>
+        <p:nvPr/>
+      </p:nvGrpSpPr>
+      <p:grpSpPr>
+        <a:xfrm>
+          <a:off x="0" y="0"/>
+          <a:ext cx="0" cy="0"/>
+          <a:chOff x="0" y="0"/>
+          <a:chExt cx="0" cy="0"/>
+        </a:xfrm>
+      </p:grpSpPr>
+      <p:sp>
+        <p:nvSpPr>
+          <p:cNvPr id="5" name="Rectangle 4"/>
+          <p:cNvSpPr/>
+          <p:nvPr/>
+        </p:nvSpPr>
+        <p:spPr>
+          <a:xfrm>
+            <a:off x="716665" y="2059287"/>
+            <a:ext cx="10758669" cy="1508105"/>
+          </a:xfrm>
+          <a:prstGeom prst="rect">
+            <a:avLst/>
+          </a:prstGeom>
+          <a:noFill/>
+          <a:ln w="9525">
+            <a:noFill/>
+            <a:miter lim="800000"/>
+            <a:headEnd/>
+            <a:tailEnd/>
+          </a:ln>
+        </p:spPr>
+        <p:txBody>
+          <a:bodyPr wrap="square" rtlCol="0">
+            <a:spAutoFit/>
+          </a:bodyPr>
+          <a:lstStyle/>
+          <a:p>
+            <a:pPr algn="ctr"/>
+            <a:endParaRPr lang="en-US" sz="4000" b="1" dirty="0">
+              <a:solidFill>
+                <a:srgbClr val="002060"/>
+              </a:solidFill>
+              <a:latin typeface="+mj-lt"/>
+            </a:endParaRPr>
+          </a:p>
+          <a:p>
+            <a:pPr algn="ctr"/>
+            <a:endParaRPr lang="en-US" sz="2000" b="1" dirty="0">
+              <a:solidFill>
+                <a:srgbClr val="002060"/>
+              </a:solidFill>
+              <a:latin typeface="+mj-lt"/>
+            </a:endParaRPr>
+          </a:p>
+          <a:p>
+            <a:pPr algn="ctr"/>
+            <a:r>
+              <a:rPr lang="en-US" sz="3200" dirty="0">
+                <a:solidFill>
+                  <a:srgbClr val="002060"/>
+                </a:solidFill>
+                <a:latin typeface="+mj-lt"/>
+              </a:rPr>
+              <a:t>Scientific Method Walkthrough</a:t>
+            </a:r>
+          </a:p>
+        </p:txBody>
+      </p:sp>
+    </p:spTree>
+    <p:extLst>
+      <p:ext uri="{BB962C8B-B14F-4D97-AF65-F5344CB8AC3E}">
+        <p14:creationId xmlns:p14="http://schemas.microsoft.com/office/powerpoint/2010/main" val="3402780149"/>
+      </p:ext>
+    </p:extLst>
+  </p:cSld>
+  <p:clrMapOvr>
+    <a:masterClrMapping/>
+  </p:clrMapOvr>
+  <p:transition>
+    <p:fade/>
+  </p:transition>
+</p:sld>
+</file>
+
+<file path=ppt/slides/slide22.xml><?xml version="1.0" encoding="utf-8"?>
 <p:sld xmlns:a="http://schemas.openxmlformats.org/drawingml/2006/main" xmlns:r="http://schemas.openxmlformats.org/officeDocument/2006/relationships" xmlns:p="http://schemas.openxmlformats.org/presentationml/2006/main">
   <p:cSld>
     <p:spTree>
@@ -9632,7 +9472,7 @@
 </p:sld>
 </file>
 
-<file path=ppt/slides/slide25.xml><?xml version="1.0" encoding="utf-8"?>
+<file path=ppt/slides/slide23.xml><?xml version="1.0" encoding="utf-8"?>
 <p:sld xmlns:a="http://schemas.openxmlformats.org/drawingml/2006/main" xmlns:r="http://schemas.openxmlformats.org/officeDocument/2006/relationships" xmlns:p="http://schemas.openxmlformats.org/presentationml/2006/main">
   <p:cSld>
     <p:spTree>
@@ -10868,6 +10708,128 @@
                       </p:childTnLst>
                     </p:cTn>
                   </p:par>
+                  <p:par>
+                    <p:cTn id="20" fill="hold">
+                      <p:stCondLst>
+                        <p:cond delay="indefinite"/>
+                      </p:stCondLst>
+                      <p:childTnLst>
+                        <p:par>
+                          <p:cTn id="21" fill="hold">
+                            <p:stCondLst>
+                              <p:cond delay="0"/>
+                            </p:stCondLst>
+                            <p:childTnLst>
+                              <p:par>
+                                <p:cTn id="22" presetID="31" presetClass="entr" presetSubtype="0" fill="hold" grpId="0" nodeType="clickEffect">
+                                  <p:stCondLst>
+                                    <p:cond delay="0"/>
+                                  </p:stCondLst>
+                                  <p:childTnLst>
+                                    <p:set>
+                                      <p:cBhvr>
+                                        <p:cTn id="23" dur="1" fill="hold">
+                                          <p:stCondLst>
+                                            <p:cond delay="0"/>
+                                          </p:stCondLst>
+                                        </p:cTn>
+                                        <p:tgtEl>
+                                          <p:spTgt spid="4"/>
+                                        </p:tgtEl>
+                                        <p:attrNameLst>
+                                          <p:attrName>style.visibility</p:attrName>
+                                        </p:attrNameLst>
+                                      </p:cBhvr>
+                                      <p:to>
+                                        <p:strVal val="visible"/>
+                                      </p:to>
+                                    </p:set>
+                                    <p:anim calcmode="lin" valueType="num">
+                                      <p:cBhvr>
+                                        <p:cTn id="24" dur="1000" fill="hold"/>
+                                        <p:tgtEl>
+                                          <p:spTgt spid="4"/>
+                                        </p:tgtEl>
+                                        <p:attrNameLst>
+                                          <p:attrName>ppt_w</p:attrName>
+                                        </p:attrNameLst>
+                                      </p:cBhvr>
+                                      <p:tavLst>
+                                        <p:tav tm="0">
+                                          <p:val>
+                                            <p:fltVal val="0"/>
+                                          </p:val>
+                                        </p:tav>
+                                        <p:tav tm="100000">
+                                          <p:val>
+                                            <p:strVal val="#ppt_w"/>
+                                          </p:val>
+                                        </p:tav>
+                                      </p:tavLst>
+                                    </p:anim>
+                                    <p:anim calcmode="lin" valueType="num">
+                                      <p:cBhvr>
+                                        <p:cTn id="25" dur="1000" fill="hold"/>
+                                        <p:tgtEl>
+                                          <p:spTgt spid="4"/>
+                                        </p:tgtEl>
+                                        <p:attrNameLst>
+                                          <p:attrName>ppt_h</p:attrName>
+                                        </p:attrNameLst>
+                                      </p:cBhvr>
+                                      <p:tavLst>
+                                        <p:tav tm="0">
+                                          <p:val>
+                                            <p:fltVal val="0"/>
+                                          </p:val>
+                                        </p:tav>
+                                        <p:tav tm="100000">
+                                          <p:val>
+                                            <p:strVal val="#ppt_h"/>
+                                          </p:val>
+                                        </p:tav>
+                                      </p:tavLst>
+                                    </p:anim>
+                                    <p:anim calcmode="lin" valueType="num">
+                                      <p:cBhvr>
+                                        <p:cTn id="26" dur="1000" fill="hold"/>
+                                        <p:tgtEl>
+                                          <p:spTgt spid="4"/>
+                                        </p:tgtEl>
+                                        <p:attrNameLst>
+                                          <p:attrName>style.rotation</p:attrName>
+                                        </p:attrNameLst>
+                                      </p:cBhvr>
+                                      <p:tavLst>
+                                        <p:tav tm="0">
+                                          <p:val>
+                                            <p:fltVal val="90"/>
+                                          </p:val>
+                                        </p:tav>
+                                        <p:tav tm="100000">
+                                          <p:val>
+                                            <p:fltVal val="0"/>
+                                          </p:val>
+                                        </p:tav>
+                                      </p:tavLst>
+                                    </p:anim>
+                                    <p:animEffect transition="in" filter="fade">
+                                      <p:cBhvr>
+                                        <p:cTn id="27" dur="1000"/>
+                                        <p:tgtEl>
+                                          <p:spTgt spid="4"/>
+                                        </p:tgtEl>
+                                      </p:cBhvr>
+                                    </p:animEffect>
+                                  </p:childTnLst>
+                                </p:cTn>
+                              </p:par>
+                            </p:childTnLst>
+                          </p:cTn>
+                        </p:par>
+                      </p:childTnLst>
+                    </p:cTn>
+                  </p:par>
                 </p:childTnLst>
               </p:cTn>
               <p:prevCondLst>
@@ -10891,12 +10853,13 @@
     </p:tnLst>
     <p:bldLst>
       <p:bldP spid="44" grpId="0"/>
+      <p:bldP spid="4" grpId="0" animBg="1"/>
     </p:bldLst>
   </p:timing>
 </p:sld>
 </file>
 
-<file path=ppt/slides/slide26.xml><?xml version="1.0" encoding="utf-8"?>
+<file path=ppt/slides/slide24.xml><?xml version="1.0" encoding="utf-8"?>
 <p:sld xmlns:a="http://schemas.openxmlformats.org/drawingml/2006/main" xmlns:r="http://schemas.openxmlformats.org/officeDocument/2006/relationships" xmlns:p="http://schemas.openxmlformats.org/presentationml/2006/main">
   <p:cSld>
     <p:spTree>
@@ -11660,6 +11623,193 @@
 </p:sld>
 </file>
 
+<file path=ppt/slides/slide25.xml><?xml version="1.0" encoding="utf-8"?>
+<p:sld xmlns:a="http://schemas.openxmlformats.org/drawingml/2006/main" xmlns:r="http://schemas.openxmlformats.org/officeDocument/2006/relationships" xmlns:p="http://schemas.openxmlformats.org/presentationml/2006/main">
+  <p:cSld>
+    <p:spTree>
+      <p:nvGrpSpPr>
+        <p:cNvPr id="1" name=""/>
+        <p:cNvGrpSpPr/>
+        <p:nvPr/>
+      </p:nvGrpSpPr>
+      <p:grpSpPr>
+        <a:xfrm>
+          <a:off x="0" y="0"/>
+          <a:ext cx="0" cy="0"/>
+          <a:chOff x="0" y="0"/>
+          <a:chExt cx="0" cy="0"/>
+        </a:xfrm>
+      </p:grpSpPr>
+      <p:sp>
+        <p:nvSpPr>
+          <p:cNvPr id="2" name="Title 1">
+            <a:extLst>
+              <a:ext uri="{FF2B5EF4-FFF2-40B4-BE49-F238E27FC236}">
+                <a16:creationId xmlns:a16="http://schemas.microsoft.com/office/drawing/2014/main" id="{D18EDFC5-AC11-42F7-9D1E-D700640DFA6A}"/>
+              </a:ext>
+            </a:extLst>
+          </p:cNvPr>
+          <p:cNvSpPr>
+            <a:spLocks noGrp="1"/>
+          </p:cNvSpPr>
+          <p:nvPr>
+            <p:ph type="title"/>
+          </p:nvPr>
+        </p:nvSpPr>
+        <p:spPr/>
+        <p:txBody>
+          <a:bodyPr/>
+          <a:lstStyle/>
+          <a:p>
+            <a:r>
+              <a:rPr lang="en-US" dirty="0"/>
+              <a:t>Get help with high value bugs!</a:t>
+            </a:r>
+          </a:p>
+        </p:txBody>
+      </p:sp>
+      <p:sp>
+        <p:nvSpPr>
+          <p:cNvPr id="3" name="Content Placeholder 2">
+            <a:extLst>
+              <a:ext uri="{FF2B5EF4-FFF2-40B4-BE49-F238E27FC236}">
+                <a16:creationId xmlns:a16="http://schemas.microsoft.com/office/drawing/2014/main" id="{065D0131-B1B4-426E-9ABF-71983C3B53A4}"/>
+              </a:ext>
+            </a:extLst>
+          </p:cNvPr>
+          <p:cNvSpPr>
+            <a:spLocks noGrp="1"/>
+          </p:cNvSpPr>
+          <p:nvPr>
+            <p:ph idx="1"/>
+          </p:nvPr>
+        </p:nvSpPr>
+        <p:spPr/>
+        <p:txBody>
+          <a:bodyPr/>
+          <a:lstStyle/>
+          <a:p>
+            <a:r>
+              <a:rPr lang="en-US" dirty="0"/>
+              <a:t>That was why you practiced!</a:t>
+            </a:r>
+          </a:p>
+          <a:p>
+            <a:r>
+              <a:rPr lang="en-US" dirty="0"/>
+              <a:t>Concentrate on hypotheses and work in parallel groups</a:t>
+            </a:r>
+          </a:p>
+          <a:p>
+            <a:r>
+              <a:rPr lang="en-US" dirty="0"/>
+              <a:t>If you’re stuck expand the circle</a:t>
+            </a:r>
+          </a:p>
+          <a:p>
+            <a:r>
+              <a:rPr lang="en-US" dirty="0"/>
+              <a:t>John Robbins consults</a:t>
+            </a:r>
+          </a:p>
+        </p:txBody>
+      </p:sp>
+    </p:spTree>
+    <p:extLst>
+      <p:ext uri="{BB962C8B-B14F-4D97-AF65-F5344CB8AC3E}">
+        <p14:creationId xmlns:p14="http://schemas.microsoft.com/office/powerpoint/2010/main" val="2035309940"/>
+      </p:ext>
+    </p:extLst>
+  </p:cSld>
+  <p:clrMapOvr>
+    <a:masterClrMapping/>
+  </p:clrMapOvr>
+</p:sld>
+</file>
+
+<file path=ppt/slides/slide26.xml><?xml version="1.0" encoding="utf-8"?>
+<p:sld xmlns:a="http://schemas.openxmlformats.org/drawingml/2006/main" xmlns:r="http://schemas.openxmlformats.org/officeDocument/2006/relationships" xmlns:p="http://schemas.openxmlformats.org/presentationml/2006/main">
+  <p:cSld>
+    <p:spTree>
+      <p:nvGrpSpPr>
+        <p:cNvPr id="1" name=""/>
+        <p:cNvGrpSpPr/>
+        <p:nvPr/>
+      </p:nvGrpSpPr>
+      <p:grpSpPr>
+        <a:xfrm>
+          <a:off x="0" y="0"/>
+          <a:ext cx="0" cy="0"/>
+          <a:chOff x="0" y="0"/>
+          <a:chExt cx="0" cy="0"/>
+        </a:xfrm>
+      </p:grpSpPr>
+      <p:sp>
+        <p:nvSpPr>
+          <p:cNvPr id="4" name="Title 3">
+            <a:extLst>
+              <a:ext uri="{FF2B5EF4-FFF2-40B4-BE49-F238E27FC236}">
+                <a16:creationId xmlns:a16="http://schemas.microsoft.com/office/drawing/2014/main" id="{5D559ADB-31C0-4B79-8B41-83D9F5D007E2}"/>
+              </a:ext>
+            </a:extLst>
+          </p:cNvPr>
+          <p:cNvSpPr>
+            <a:spLocks noGrp="1"/>
+          </p:cNvSpPr>
+          <p:nvPr>
+            <p:ph type="title"/>
+          </p:nvPr>
+        </p:nvSpPr>
+        <p:spPr/>
+        <p:txBody>
+          <a:bodyPr/>
+          <a:lstStyle/>
+          <a:p>
+            <a:r>
+              <a:rPr lang="en-US" dirty="0"/>
+              <a:t>Light Profiling</a:t>
+            </a:r>
+          </a:p>
+        </p:txBody>
+      </p:sp>
+      <p:sp>
+        <p:nvSpPr>
+          <p:cNvPr id="5" name="Text Placeholder 4">
+            <a:extLst>
+              <a:ext uri="{FF2B5EF4-FFF2-40B4-BE49-F238E27FC236}">
+                <a16:creationId xmlns:a16="http://schemas.microsoft.com/office/drawing/2014/main" id="{CC15F277-CA4A-4EFF-8B22-80CA3695E4FB}"/>
+              </a:ext>
+            </a:extLst>
+          </p:cNvPr>
+          <p:cNvSpPr>
+            <a:spLocks noGrp="1"/>
+          </p:cNvSpPr>
+          <p:nvPr>
+            <p:ph type="body" idx="1"/>
+          </p:nvPr>
+        </p:nvSpPr>
+        <p:spPr/>
+        <p:txBody>
+          <a:bodyPr/>
+          <a:lstStyle/>
+          <a:p>
+            <a:endParaRPr lang="en-US"/>
+          </a:p>
+        </p:txBody>
+      </p:sp>
+    </p:spTree>
+    <p:extLst>
+      <p:ext uri="{BB962C8B-B14F-4D97-AF65-F5344CB8AC3E}">
+        <p14:creationId xmlns:p14="http://schemas.microsoft.com/office/powerpoint/2010/main" val="4213854344"/>
+      </p:ext>
+    </p:extLst>
+  </p:cSld>
+  <p:clrMapOvr>
+    <a:masterClrMapping/>
+  </p:clrMapOvr>
+</p:sld>
+</file>
+
 <file path=ppt/slides/slide27.xml><?xml version="1.0" encoding="utf-8"?>
 <p:sld xmlns:a="http://schemas.openxmlformats.org/drawingml/2006/main" xmlns:r="http://schemas.openxmlformats.org/officeDocument/2006/relationships" xmlns:p="http://schemas.openxmlformats.org/presentationml/2006/main">
   <p:cSld>
@@ -11679,10 +11829,10 @@
       </p:grpSpPr>
       <p:sp>
         <p:nvSpPr>
-          <p:cNvPr id="2" name="Title 1">
+          <p:cNvPr id="4" name="Title 3">
             <a:extLst>
               <a:ext uri="{FF2B5EF4-FFF2-40B4-BE49-F238E27FC236}">
-                <a16:creationId xmlns:a16="http://schemas.microsoft.com/office/drawing/2014/main" id="{D18EDFC5-AC11-42F7-9D1E-D700640DFA6A}"/>
+                <a16:creationId xmlns:a16="http://schemas.microsoft.com/office/drawing/2014/main" id="{C1967D69-690C-4681-929C-BC39FE826AED}"/>
               </a:ext>
             </a:extLst>
           </p:cNvPr>
@@ -11700,17 +11850,17 @@
           <a:p>
             <a:r>
               <a:rPr lang="en-US" dirty="0"/>
-              <a:t>Get help with high value bugs!</a:t>
-            </a:r>
-          </a:p>
-        </p:txBody>
-      </p:sp>
-      <p:sp>
-        <p:nvSpPr>
-          <p:cNvPr id="3" name="Content Placeholder 2">
+              <a:t>Before you use Visual Studio Debugging/Profiling, download symbols	</a:t>
+            </a:r>
+          </a:p>
+        </p:txBody>
+      </p:sp>
+      <p:sp>
+        <p:nvSpPr>
+          <p:cNvPr id="5" name="Content Placeholder 4">
             <a:extLst>
               <a:ext uri="{FF2B5EF4-FFF2-40B4-BE49-F238E27FC236}">
-                <a16:creationId xmlns:a16="http://schemas.microsoft.com/office/drawing/2014/main" id="{065D0131-B1B4-426E-9ABF-71983C3B53A4}"/>
+                <a16:creationId xmlns:a16="http://schemas.microsoft.com/office/drawing/2014/main" id="{5AA22420-460B-4D0D-9716-A08FF598F620}"/>
               </a:ext>
             </a:extLst>
           </p:cNvPr>
@@ -11721,32 +11871,29 @@
             <p:ph idx="1"/>
           </p:nvPr>
         </p:nvSpPr>
-        <p:spPr/>
+        <p:spPr>
+          <a:xfrm>
+            <a:off x="838200" y="2582487"/>
+            <a:ext cx="10515600" cy="3594476"/>
+          </a:xfrm>
+        </p:spPr>
         <p:txBody>
           <a:bodyPr/>
           <a:lstStyle/>
           <a:p>
             <a:r>
+              <a:rPr lang="en-US" dirty="0" err="1"/>
+              <a:t>Ctl</a:t>
+            </a:r>
+            <a:r>
               <a:rPr lang="en-US" dirty="0"/>
-              <a:t>That was why you practiced!</a:t>
+              <a:t> Q and type “Symbol”</a:t>
             </a:r>
           </a:p>
           <a:p>
             <a:r>
               <a:rPr lang="en-US" dirty="0"/>
-              <a:t>Concentrate on hypotheses and work in parallel groups</a:t>
-            </a:r>
-          </a:p>
-          <a:p>
-            <a:r>
-              <a:rPr lang="en-US" dirty="0"/>
-              <a:t>If you’re stuck expand the circle</a:t>
-            </a:r>
-          </a:p>
-          <a:p>
-            <a:r>
-              <a:rPr lang="en-US" dirty="0"/>
-              <a:t>John Robbins consults</a:t>
+              <a:t>Set cache, hit load, and get some tea</a:t>
             </a:r>
           </a:p>
         </p:txBody>
@@ -11754,7 +11901,7 @@
     </p:spTree>
     <p:extLst>
       <p:ext uri="{BB962C8B-B14F-4D97-AF65-F5344CB8AC3E}">
-        <p14:creationId xmlns:p14="http://schemas.microsoft.com/office/powerpoint/2010/main" val="2035309940"/>
+        <p14:creationId xmlns:p14="http://schemas.microsoft.com/office/powerpoint/2010/main" val="3187088046"/>
       </p:ext>
     </p:extLst>
   </p:cSld>
@@ -11786,7 +11933,7 @@
           <p:cNvPr id="4" name="Title 3">
             <a:extLst>
               <a:ext uri="{FF2B5EF4-FFF2-40B4-BE49-F238E27FC236}">
-                <a16:creationId xmlns:a16="http://schemas.microsoft.com/office/drawing/2014/main" id="{5D559ADB-31C0-4B79-8B41-83D9F5D007E2}"/>
+                <a16:creationId xmlns:a16="http://schemas.microsoft.com/office/drawing/2014/main" id="{C1967D69-690C-4681-929C-BC39FE826AED}"/>
               </a:ext>
             </a:extLst>
           </p:cNvPr>
@@ -11804,17 +11951,24 @@
           <a:p>
             <a:r>
               <a:rPr lang="en-US" dirty="0"/>
-              <a:t>Profiling</a:t>
-            </a:r>
-          </a:p>
-        </p:txBody>
-      </p:sp>
-      <p:sp>
-        <p:nvSpPr>
-          <p:cNvPr id="5" name="Text Placeholder 4">
+              <a:t>Before using VS to debug a project, </a:t>
+            </a:r>
+            <a:br>
+              <a:rPr lang="en-US" dirty="0"/>
+            </a:br>
+            <a:r>
+              <a:rPr lang="en-US" dirty="0"/>
+              <a:t>set Debugging Information to full	</a:t>
+            </a:r>
+          </a:p>
+        </p:txBody>
+      </p:sp>
+      <p:sp>
+        <p:nvSpPr>
+          <p:cNvPr id="5" name="Content Placeholder 4">
             <a:extLst>
               <a:ext uri="{FF2B5EF4-FFF2-40B4-BE49-F238E27FC236}">
-                <a16:creationId xmlns:a16="http://schemas.microsoft.com/office/drawing/2014/main" id="{CC15F277-CA4A-4EFF-8B22-80CA3695E4FB}"/>
+                <a16:creationId xmlns:a16="http://schemas.microsoft.com/office/drawing/2014/main" id="{5AA22420-460B-4D0D-9716-A08FF598F620}"/>
               </a:ext>
             </a:extLst>
           </p:cNvPr>
@@ -11822,22 +11976,30 @@
             <a:spLocks noGrp="1"/>
           </p:cNvSpPr>
           <p:nvPr>
-            <p:ph type="body" idx="1"/>
+            <p:ph idx="1"/>
           </p:nvPr>
         </p:nvSpPr>
-        <p:spPr/>
+        <p:spPr>
+          <a:xfrm>
+            <a:off x="838200" y="2582487"/>
+            <a:ext cx="10515600" cy="3594476"/>
+          </a:xfrm>
+        </p:spPr>
         <p:txBody>
           <a:bodyPr/>
           <a:lstStyle/>
           <a:p>
-            <a:endParaRPr lang="en-US"/>
+            <a:r>
+              <a:rPr lang="en-US" dirty="0"/>
+              <a:t>Project Properties/Build/Advanced</a:t>
+            </a:r>
           </a:p>
         </p:txBody>
       </p:sp>
     </p:spTree>
     <p:extLst>
       <p:ext uri="{BB962C8B-B14F-4D97-AF65-F5344CB8AC3E}">
-        <p14:creationId xmlns:p14="http://schemas.microsoft.com/office/powerpoint/2010/main" val="4213854344"/>
+        <p14:creationId xmlns:p14="http://schemas.microsoft.com/office/powerpoint/2010/main" val="3565354693"/>
       </p:ext>
     </p:extLst>
   </p:cSld>
@@ -11866,66 +12028,59 @@
       </p:grpSpPr>
       <p:sp>
         <p:nvSpPr>
-          <p:cNvPr id="4" name="Title 3">
-            <a:extLst>
-              <a:ext uri="{FF2B5EF4-FFF2-40B4-BE49-F238E27FC236}">
-                <a16:creationId xmlns:a16="http://schemas.microsoft.com/office/drawing/2014/main" id="{C1967D69-690C-4681-929C-BC39FE826AED}"/>
-              </a:ext>
-            </a:extLst>
-          </p:cNvPr>
-          <p:cNvSpPr>
-            <a:spLocks noGrp="1"/>
-          </p:cNvSpPr>
-          <p:nvPr>
-            <p:ph type="title"/>
-          </p:nvPr>
-        </p:nvSpPr>
-        <p:spPr/>
-        <p:txBody>
-          <a:bodyPr/>
-          <a:lstStyle/>
-          <a:p>
-            <a:r>
-              <a:rPr lang="en-US" dirty="0"/>
-              <a:t>Before you use Visual Studio Debugging/Profiling, download symbols	</a:t>
-            </a:r>
-          </a:p>
-        </p:txBody>
-      </p:sp>
-      <p:sp>
-        <p:nvSpPr>
-          <p:cNvPr id="5" name="Content Placeholder 4">
-            <a:extLst>
-              <a:ext uri="{FF2B5EF4-FFF2-40B4-BE49-F238E27FC236}">
-                <a16:creationId xmlns:a16="http://schemas.microsoft.com/office/drawing/2014/main" id="{5AA22420-460B-4D0D-9716-A08FF598F620}"/>
-              </a:ext>
-            </a:extLst>
-          </p:cNvPr>
-          <p:cNvSpPr>
-            <a:spLocks noGrp="1"/>
-          </p:cNvSpPr>
-          <p:nvPr>
-            <p:ph idx="1"/>
-          </p:nvPr>
-        </p:nvSpPr>
-        <p:spPr/>
-        <p:txBody>
-          <a:bodyPr/>
-          <a:lstStyle/>
-          <a:p>
-            <a:r>
-              <a:rPr lang="en-US" dirty="0" err="1"/>
-              <a:t>Ctl</a:t>
-            </a:r>
-            <a:r>
-              <a:rPr lang="en-US" dirty="0"/>
-              <a:t> Q and type “Symbol”</a:t>
-            </a:r>
-          </a:p>
-          <a:p>
-            <a:r>
-              <a:rPr lang="en-US" dirty="0"/>
-              <a:t>Set cache, hit load, and get some tea</a:t>
+          <p:cNvPr id="5" name="Rectangle 4"/>
+          <p:cNvSpPr/>
+          <p:nvPr/>
+        </p:nvSpPr>
+        <p:spPr>
+          <a:xfrm>
+            <a:off x="716665" y="2059287"/>
+            <a:ext cx="10758669" cy="1508105"/>
+          </a:xfrm>
+          <a:prstGeom prst="rect">
+            <a:avLst/>
+          </a:prstGeom>
+          <a:noFill/>
+          <a:ln w="9525">
+            <a:noFill/>
+            <a:miter lim="800000"/>
+            <a:headEnd/>
+            <a:tailEnd/>
+          </a:ln>
+        </p:spPr>
+        <p:txBody>
+          <a:bodyPr wrap="square" rtlCol="0">
+            <a:spAutoFit/>
+          </a:bodyPr>
+          <a:lstStyle/>
+          <a:p>
+            <a:pPr algn="ctr"/>
+            <a:endParaRPr lang="en-US" sz="4000" b="1" dirty="0">
+              <a:solidFill>
+                <a:srgbClr val="002060"/>
+              </a:solidFill>
+              <a:latin typeface="+mj-lt"/>
+            </a:endParaRPr>
+          </a:p>
+          <a:p>
+            <a:pPr algn="ctr"/>
+            <a:endParaRPr lang="en-US" sz="2000" b="1" dirty="0">
+              <a:solidFill>
+                <a:srgbClr val="002060"/>
+              </a:solidFill>
+              <a:latin typeface="+mj-lt"/>
+            </a:endParaRPr>
+          </a:p>
+          <a:p>
+            <a:pPr algn="ctr"/>
+            <a:r>
+              <a:rPr lang="en-US" sz="3200" dirty="0">
+                <a:solidFill>
+                  <a:srgbClr val="002060"/>
+                </a:solidFill>
+                <a:latin typeface="+mj-lt"/>
+              </a:rPr>
+              <a:t>Profiling Experiment</a:t>
             </a:r>
           </a:p>
         </p:txBody>
@@ -11933,13 +12088,16 @@
     </p:spTree>
     <p:extLst>
       <p:ext uri="{BB962C8B-B14F-4D97-AF65-F5344CB8AC3E}">
-        <p14:creationId xmlns:p14="http://schemas.microsoft.com/office/powerpoint/2010/main" val="3187088046"/>
+        <p14:creationId xmlns:p14="http://schemas.microsoft.com/office/powerpoint/2010/main" val="1505918522"/>
       </p:ext>
     </p:extLst>
   </p:cSld>
   <p:clrMapOvr>
     <a:masterClrMapping/>
   </p:clrMapOvr>
+  <p:transition>
+    <p:fade/>
+  </p:transition>
 </p:sld>
 </file>
 
@@ -12196,10 +12354,10 @@
       </p:grpSpPr>
       <p:sp>
         <p:nvSpPr>
-          <p:cNvPr id="2" name="Title 1">
+          <p:cNvPr id="5" name="Title 4">
             <a:extLst>
               <a:ext uri="{FF2B5EF4-FFF2-40B4-BE49-F238E27FC236}">
-                <a16:creationId xmlns:a16="http://schemas.microsoft.com/office/drawing/2014/main" id="{459D4BF3-E2D9-40C0-BF52-AEDBE881A97D}"/>
+                <a16:creationId xmlns:a16="http://schemas.microsoft.com/office/drawing/2014/main" id="{55DC7F15-0E18-4901-9BB5-8A9E88E8C9F7}"/>
               </a:ext>
             </a:extLst>
           </p:cNvPr>
@@ -12216,18 +12374,18 @@
           <a:lstStyle/>
           <a:p>
             <a:r>
-              <a:rPr lang="en-US"/>
-              <a:t>That Window you just close…</a:t>
-            </a:r>
-          </a:p>
-        </p:txBody>
-      </p:sp>
-      <p:sp>
-        <p:nvSpPr>
-          <p:cNvPr id="3" name="Content Placeholder 2">
+              <a:rPr lang="en-US" dirty="0"/>
+              <a:t>Thank you!</a:t>
+            </a:r>
+          </a:p>
+        </p:txBody>
+      </p:sp>
+      <p:sp>
+        <p:nvSpPr>
+          <p:cNvPr id="6" name="Content Placeholder 5">
             <a:extLst>
               <a:ext uri="{FF2B5EF4-FFF2-40B4-BE49-F238E27FC236}">
-                <a16:creationId xmlns:a16="http://schemas.microsoft.com/office/drawing/2014/main" id="{960AB389-CF1F-4BD4-870D-200554241049}"/>
+                <a16:creationId xmlns:a16="http://schemas.microsoft.com/office/drawing/2014/main" id="{1035D808-EED4-428E-B110-60C5BC00C81A}"/>
               </a:ext>
             </a:extLst>
           </p:cNvPr>
@@ -12240,17 +12398,76 @@
         </p:nvSpPr>
         <p:spPr/>
         <p:txBody>
-          <a:bodyPr/>
-          <a:lstStyle/>
-          <a:p>
-            <a:endParaRPr lang="en-US"/>
+          <a:bodyPr>
+            <a:noAutofit/>
+          </a:bodyPr>
+          <a:lstStyle/>
+          <a:p>
+            <a:r>
+              <a:rPr lang="en-US" dirty="0">
+                <a:solidFill>
+                  <a:srgbClr val="000000"/>
+                </a:solidFill>
+                <a:latin typeface="ff-dagny-web-pro"/>
+              </a:rPr>
+              <a:t>Debugging is a game of strategy.</a:t>
+            </a:r>
+          </a:p>
+          <a:p>
+            <a:r>
+              <a:rPr lang="en-US" dirty="0">
+                <a:solidFill>
+                  <a:srgbClr val="000000"/>
+                </a:solidFill>
+                <a:latin typeface="ff-dagny-web-pro"/>
+              </a:rPr>
+              <a:t>The rules are set by the computer, your debugger, and requirements or user expectations. </a:t>
+            </a:r>
+          </a:p>
+          <a:p>
+            <a:r>
+              <a:rPr lang="en-US" dirty="0">
+                <a:solidFill>
+                  <a:srgbClr val="000000"/>
+                </a:solidFill>
+                <a:latin typeface="ff-dagny-web-pro"/>
+              </a:rPr>
+              <a:t>You may enter the contest expecting a trivial opponent, only to find it like Hydra with two new problems sprouting for each one you solve. </a:t>
+            </a:r>
+          </a:p>
+          <a:p>
+            <a:r>
+              <a:rPr lang="en-US" dirty="0">
+                <a:solidFill>
+                  <a:srgbClr val="000000"/>
+                </a:solidFill>
+                <a:latin typeface="ff-dagny-web-pro"/>
+              </a:rPr>
+              <a:t>It’s a critical game because we fix bugs from the time we first check in code, and the cost of each bug tends to increase across the project lifecycle.</a:t>
+            </a:r>
+          </a:p>
+          <a:p>
+            <a:r>
+              <a:rPr lang="en-US" dirty="0"/>
+              <a:t>Practice profiling, it’s FUN!</a:t>
+            </a:r>
+            <a:br>
+              <a:rPr lang="en-US" dirty="0"/>
+            </a:br>
+            <a:br>
+              <a:rPr lang="en-US" dirty="0"/>
+            </a:br>
+            <a:endParaRPr lang="en-US" dirty="0"/>
+          </a:p>
+          <a:p>
+            <a:endParaRPr lang="en-US" dirty="0"/>
           </a:p>
         </p:txBody>
       </p:sp>
     </p:spTree>
     <p:extLst>
       <p:ext uri="{BB962C8B-B14F-4D97-AF65-F5344CB8AC3E}">
-        <p14:creationId xmlns:p14="http://schemas.microsoft.com/office/powerpoint/2010/main" val="3234486819"/>
+        <p14:creationId xmlns:p14="http://schemas.microsoft.com/office/powerpoint/2010/main" val="3066053709"/>
       </p:ext>
     </p:extLst>
   </p:cSld>

</xml_diff>

<commit_message>
Can't help it, I keep tweaking slides
</commit_message>
<xml_diff>
--- a/Debugging.pptx
+++ b/Debugging.pptx
@@ -12370,13 +12370,40 @@
         </p:nvSpPr>
         <p:spPr/>
         <p:txBody>
-          <a:bodyPr/>
+          <a:bodyPr>
+            <a:normAutofit fontScale="90000"/>
+          </a:bodyPr>
           <a:lstStyle/>
           <a:p>
             <a:r>
               <a:rPr lang="en-US" dirty="0"/>
               <a:t>Thank you!</a:t>
             </a:r>
+            <a:br>
+              <a:rPr lang="en-US" dirty="0"/>
+            </a:br>
+            <a:r>
+              <a:rPr lang="en-US" sz="2800" dirty="0">
+                <a:hlinkClick r:id="rId2"/>
+              </a:rPr>
+              <a:t>https://github.com/KathleenDollard/talks-debugging</a:t>
+            </a:r>
+            <a:br>
+              <a:rPr lang="en-US" sz="2800" dirty="0"/>
+            </a:br>
+            <a:r>
+              <a:rPr lang="en-US" sz="2800" dirty="0"/>
+              <a:t>@</a:t>
+            </a:r>
+            <a:r>
+              <a:rPr lang="en-US" sz="2800" dirty="0" err="1"/>
+              <a:t>KathleenDollard</a:t>
+            </a:r>
+            <a:r>
+              <a:rPr lang="en-US" sz="2800" dirty="0"/>
+              <a:t> </a:t>
+            </a:r>
+            <a:endParaRPr lang="en-US" dirty="0"/>
           </a:p>
         </p:txBody>
       </p:sp>
@@ -12464,6 +12491,63 @@
           </a:p>
         </p:txBody>
       </p:sp>
+      <p:pic>
+        <p:nvPicPr>
+          <p:cNvPr id="1026" name="Picture 2" descr="Image result for twitter image">
+            <a:extLst>
+              <a:ext uri="{FF2B5EF4-FFF2-40B4-BE49-F238E27FC236}">
+                <a16:creationId xmlns:a16="http://schemas.microsoft.com/office/drawing/2014/main" id="{1D842D76-B9C3-40CE-BD26-9814890A718F}"/>
+              </a:ext>
+            </a:extLst>
+          </p:cNvPr>
+          <p:cNvPicPr>
+            <a:picLocks noChangeAspect="1" noChangeArrowheads="1"/>
+          </p:cNvPicPr>
+          <p:nvPr/>
+        </p:nvPicPr>
+        <p:blipFill>
+          <a:blip r:embed="rId3">
+            <a:clrChange>
+              <a:clrFrom>
+                <a:srgbClr val="FFFFFF"/>
+              </a:clrFrom>
+              <a:clrTo>
+                <a:srgbClr val="FFFFFF">
+                  <a:alpha val="0"/>
+                </a:srgbClr>
+              </a:clrTo>
+            </a:clrChange>
+            <a:extLst>
+              <a:ext uri="{28A0092B-C50C-407E-A947-70E740481C1C}">
+                <a14:useLocalDpi xmlns:a14="http://schemas.microsoft.com/office/drawing/2010/main" val="0"/>
+              </a:ext>
+            </a:extLst>
+          </a:blip>
+          <a:srcRect/>
+          <a:stretch>
+            <a:fillRect/>
+          </a:stretch>
+        </p:blipFill>
+        <p:spPr bwMode="auto">
+          <a:xfrm>
+            <a:off x="3182387" y="1124989"/>
+            <a:ext cx="792741" cy="792741"/>
+          </a:xfrm>
+          <a:prstGeom prst="rect">
+            <a:avLst/>
+          </a:prstGeom>
+          <a:noFill/>
+          <a:extLst>
+            <a:ext uri="{909E8E84-426E-40DD-AFC4-6F175D3DCCD1}">
+              <a14:hiddenFill xmlns:a14="http://schemas.microsoft.com/office/drawing/2010/main">
+                <a:solidFill>
+                  <a:srgbClr val="FFFFFF"/>
+                </a:solidFill>
+              </a14:hiddenFill>
+            </a:ext>
+          </a:extLst>
+        </p:spPr>
+      </p:pic>
     </p:spTree>
     <p:extLst>
       <p:ext uri="{BB962C8B-B14F-4D97-AF65-F5344CB8AC3E}">
@@ -12474,6 +12558,284 @@
   <p:clrMapOvr>
     <a:masterClrMapping/>
   </p:clrMapOvr>
+  <p:timing>
+    <p:tnLst>
+      <p:par>
+        <p:cTn id="1" dur="indefinite" restart="never" nodeType="tmRoot">
+          <p:childTnLst>
+            <p:seq concurrent="1" nextAc="seek">
+              <p:cTn id="2" dur="indefinite" nodeType="mainSeq">
+                <p:childTnLst>
+                  <p:par>
+                    <p:cTn id="3" fill="hold">
+                      <p:stCondLst>
+                        <p:cond delay="indefinite"/>
+                      </p:stCondLst>
+                      <p:childTnLst>
+                        <p:par>
+                          <p:cTn id="4" fill="hold">
+                            <p:stCondLst>
+                              <p:cond delay="0"/>
+                            </p:stCondLst>
+                            <p:childTnLst>
+                              <p:par>
+                                <p:cTn id="5" presetID="1" presetClass="entr" presetSubtype="0" fill="hold" grpId="0" nodeType="clickEffect">
+                                  <p:stCondLst>
+                                    <p:cond delay="0"/>
+                                  </p:stCondLst>
+                                  <p:childTnLst>
+                                    <p:set>
+                                      <p:cBhvr>
+                                        <p:cTn id="6" dur="1" fill="hold">
+                                          <p:stCondLst>
+                                            <p:cond delay="0"/>
+                                          </p:stCondLst>
+                                        </p:cTn>
+                                        <p:tgtEl>
+                                          <p:spTgt spid="6">
+                                            <p:txEl>
+                                              <p:pRg st="0" end="0"/>
+                                            </p:txEl>
+                                          </p:spTgt>
+                                        </p:tgtEl>
+                                        <p:attrNameLst>
+                                          <p:attrName>style.visibility</p:attrName>
+                                        </p:attrNameLst>
+                                      </p:cBhvr>
+                                      <p:to>
+                                        <p:strVal val="visible"/>
+                                      </p:to>
+                                    </p:set>
+                                  </p:childTnLst>
+                                </p:cTn>
+                              </p:par>
+                            </p:childTnLst>
+                          </p:cTn>
+                        </p:par>
+                      </p:childTnLst>
+                    </p:cTn>
+                  </p:par>
+                  <p:par>
+                    <p:cTn id="7" fill="hold">
+                      <p:stCondLst>
+                        <p:cond delay="indefinite"/>
+                      </p:stCondLst>
+                      <p:childTnLst>
+                        <p:par>
+                          <p:cTn id="8" fill="hold">
+                            <p:stCondLst>
+                              <p:cond delay="0"/>
+                            </p:stCondLst>
+                            <p:childTnLst>
+                              <p:par>
+                                <p:cTn id="9" presetID="1" presetClass="entr" presetSubtype="0" fill="hold" grpId="0" nodeType="clickEffect">
+                                  <p:stCondLst>
+                                    <p:cond delay="0"/>
+                                  </p:stCondLst>
+                                  <p:childTnLst>
+                                    <p:set>
+                                      <p:cBhvr>
+                                        <p:cTn id="10" dur="1" fill="hold">
+                                          <p:stCondLst>
+                                            <p:cond delay="0"/>
+                                          </p:stCondLst>
+                                        </p:cTn>
+                                        <p:tgtEl>
+                                          <p:spTgt spid="6">
+                                            <p:txEl>
+                                              <p:pRg st="1" end="1"/>
+                                            </p:txEl>
+                                          </p:spTgt>
+                                        </p:tgtEl>
+                                        <p:attrNameLst>
+                                          <p:attrName>style.visibility</p:attrName>
+                                        </p:attrNameLst>
+                                      </p:cBhvr>
+                                      <p:to>
+                                        <p:strVal val="visible"/>
+                                      </p:to>
+                                    </p:set>
+                                  </p:childTnLst>
+                                </p:cTn>
+                              </p:par>
+                            </p:childTnLst>
+                          </p:cTn>
+                        </p:par>
+                      </p:childTnLst>
+                    </p:cTn>
+                  </p:par>
+                  <p:par>
+                    <p:cTn id="11" fill="hold">
+                      <p:stCondLst>
+                        <p:cond delay="indefinite"/>
+                      </p:stCondLst>
+                      <p:childTnLst>
+                        <p:par>
+                          <p:cTn id="12" fill="hold">
+                            <p:stCondLst>
+                              <p:cond delay="0"/>
+                            </p:stCondLst>
+                            <p:childTnLst>
+                              <p:par>
+                                <p:cTn id="13" presetID="1" presetClass="entr" presetSubtype="0" fill="hold" grpId="0" nodeType="clickEffect">
+                                  <p:stCondLst>
+                                    <p:cond delay="0"/>
+                                  </p:stCondLst>
+                                  <p:childTnLst>
+                                    <p:set>
+                                      <p:cBhvr>
+                                        <p:cTn id="14" dur="1" fill="hold">
+                                          <p:stCondLst>
+                                            <p:cond delay="0"/>
+                                          </p:stCondLst>
+                                        </p:cTn>
+                                        <p:tgtEl>
+                                          <p:spTgt spid="6">
+                                            <p:txEl>
+                                              <p:pRg st="2" end="2"/>
+                                            </p:txEl>
+                                          </p:spTgt>
+                                        </p:tgtEl>
+                                        <p:attrNameLst>
+                                          <p:attrName>style.visibility</p:attrName>
+                                        </p:attrNameLst>
+                                      </p:cBhvr>
+                                      <p:to>
+                                        <p:strVal val="visible"/>
+                                      </p:to>
+                                    </p:set>
+                                  </p:childTnLst>
+                                </p:cTn>
+                              </p:par>
+                            </p:childTnLst>
+                          </p:cTn>
+                        </p:par>
+                      </p:childTnLst>
+                    </p:cTn>
+                  </p:par>
+                  <p:par>
+                    <p:cTn id="15" fill="hold">
+                      <p:stCondLst>
+                        <p:cond delay="indefinite"/>
+                      </p:stCondLst>
+                      <p:childTnLst>
+                        <p:par>
+                          <p:cTn id="16" fill="hold">
+                            <p:stCondLst>
+                              <p:cond delay="0"/>
+                            </p:stCondLst>
+                            <p:childTnLst>
+                              <p:par>
+                                <p:cTn id="17" presetID="1" presetClass="entr" presetSubtype="0" fill="hold" grpId="0" nodeType="clickEffect">
+                                  <p:stCondLst>
+                                    <p:cond delay="0"/>
+                                  </p:stCondLst>
+                                  <p:childTnLst>
+                                    <p:set>
+                                      <p:cBhvr>
+                                        <p:cTn id="18" dur="1" fill="hold">
+                                          <p:stCondLst>
+                                            <p:cond delay="0"/>
+                                          </p:stCondLst>
+                                        </p:cTn>
+                                        <p:tgtEl>
+                                          <p:spTgt spid="6">
+                                            <p:txEl>
+                                              <p:pRg st="3" end="3"/>
+                                            </p:txEl>
+                                          </p:spTgt>
+                                        </p:tgtEl>
+                                        <p:attrNameLst>
+                                          <p:attrName>style.visibility</p:attrName>
+                                        </p:attrNameLst>
+                                      </p:cBhvr>
+                                      <p:to>
+                                        <p:strVal val="visible"/>
+                                      </p:to>
+                                    </p:set>
+                                  </p:childTnLst>
+                                </p:cTn>
+                              </p:par>
+                            </p:childTnLst>
+                          </p:cTn>
+                        </p:par>
+                      </p:childTnLst>
+                    </p:cTn>
+                  </p:par>
+                  <p:par>
+                    <p:cTn id="19" fill="hold">
+                      <p:stCondLst>
+                        <p:cond delay="indefinite"/>
+                      </p:stCondLst>
+                      <p:childTnLst>
+                        <p:par>
+                          <p:cTn id="20" fill="hold">
+                            <p:stCondLst>
+                              <p:cond delay="0"/>
+                            </p:stCondLst>
+                            <p:childTnLst>
+                              <p:par>
+                                <p:cTn id="21" presetID="1" presetClass="entr" presetSubtype="0" fill="hold" grpId="0" nodeType="clickEffect">
+                                  <p:stCondLst>
+                                    <p:cond delay="0"/>
+                                  </p:stCondLst>
+                                  <p:childTnLst>
+                                    <p:set>
+                                      <p:cBhvr>
+                                        <p:cTn id="22" dur="1" fill="hold">
+                                          <p:stCondLst>
+                                            <p:cond delay="0"/>
+                                          </p:stCondLst>
+                                        </p:cTn>
+                                        <p:tgtEl>
+                                          <p:spTgt spid="6">
+                                            <p:txEl>
+                                              <p:pRg st="4" end="4"/>
+                                            </p:txEl>
+                                          </p:spTgt>
+                                        </p:tgtEl>
+                                        <p:attrNameLst>
+                                          <p:attrName>style.visibility</p:attrName>
+                                        </p:attrNameLst>
+                                      </p:cBhvr>
+                                      <p:to>
+                                        <p:strVal val="visible"/>
+                                      </p:to>
+                                    </p:set>
+                                  </p:childTnLst>
+                                </p:cTn>
+                              </p:par>
+                            </p:childTnLst>
+                          </p:cTn>
+                        </p:par>
+                      </p:childTnLst>
+                    </p:cTn>
+                  </p:par>
+                </p:childTnLst>
+              </p:cTn>
+              <p:prevCondLst>
+                <p:cond evt="onPrev" delay="0">
+                  <p:tgtEl>
+                    <p:sldTgt/>
+                  </p:tgtEl>
+                </p:cond>
+              </p:prevCondLst>
+              <p:nextCondLst>
+                <p:cond evt="onNext" delay="0">
+                  <p:tgtEl>
+                    <p:sldTgt/>
+                  </p:tgtEl>
+                </p:cond>
+              </p:nextCondLst>
+            </p:seq>
+          </p:childTnLst>
+        </p:cTn>
+      </p:par>
+    </p:tnLst>
+    <p:bldLst>
+      <p:bldP spid="6" grpId="0" build="p"/>
+    </p:bldLst>
+  </p:timing>
 </p:sld>
 </file>
 

</xml_diff>